<commit_message>
fixed a bug in unemployed prices
</commit_message>
<xml_diff>
--- a/IX_IPC/tags_certificates/tags.pptx
+++ b/IX_IPC/tags_certificates/tags.pptx
@@ -112,6 +112,14 @@
 </p:presentation>
 </file>
 
+<file path=ppt/revisionInfo.xml><?xml version="1.0" encoding="utf-8"?>
+<p1510:revInfo xmlns:a="http://schemas.openxmlformats.org/drawingml/2006/main" xmlns:r="http://schemas.openxmlformats.org/officeDocument/2006/relationships" xmlns:p1510="http://schemas.microsoft.com/office/powerpoint/2015/10/main">
+  <p1510:revLst>
+    <p1510:client id="{F5A71E99-14EB-40F5-B0A3-E2EF87BEEE38}" v="1" dt="2024-10-14T15:09:18.153"/>
+  </p1510:revLst>
+</p1510:revInfo>
+</file>
+
 <file path=ppt/changesInfos/changesInfo1.xml><?xml version="1.0" encoding="utf-8"?>
 <pc:chgInfo xmlns:a="http://schemas.openxmlformats.org/drawingml/2006/main" xmlns:r="http://schemas.openxmlformats.org/officeDocument/2006/relationships" xmlns:ac="http://schemas.microsoft.com/office/drawing/2013/main/command" xmlns:pc="http://schemas.microsoft.com/office/powerpoint/2013/main/command">
   <pc:docChgLst>
@@ -141,6 +149,126 @@
           <pc:docMk/>
           <pc:sldMk cId="625948321" sldId="259"/>
         </pc:sldMkLst>
+      </pc:sldChg>
+    </pc:docChg>
+  </pc:docChgLst>
+  <pc:docChgLst>
+    <pc:chgData name="André Amado" userId="cf82f2dece387b4b" providerId="LiveId" clId="{F5A71E99-14EB-40F5-B0A3-E2EF87BEEE38}"/>
+    <pc:docChg chg="modSld">
+      <pc:chgData name="André Amado" userId="cf82f2dece387b4b" providerId="LiveId" clId="{F5A71E99-14EB-40F5-B0A3-E2EF87BEEE38}" dt="2024-10-14T15:09:18.153" v="18" actId="164"/>
+      <pc:docMkLst>
+        <pc:docMk/>
+      </pc:docMkLst>
+      <pc:sldChg chg="addSp modSp mod">
+        <pc:chgData name="André Amado" userId="cf82f2dece387b4b" providerId="LiveId" clId="{F5A71E99-14EB-40F5-B0A3-E2EF87BEEE38}" dt="2024-10-14T15:09:18.153" v="18" actId="164"/>
+        <pc:sldMkLst>
+          <pc:docMk/>
+          <pc:sldMk cId="4292944877" sldId="257"/>
+        </pc:sldMkLst>
+        <pc:spChg chg="add mod ord">
+          <ac:chgData name="André Amado" userId="cf82f2dece387b4b" providerId="LiveId" clId="{F5A71E99-14EB-40F5-B0A3-E2EF87BEEE38}" dt="2024-10-14T15:09:18.153" v="18" actId="164"/>
+          <ac:spMkLst>
+            <pc:docMk/>
+            <pc:sldMk cId="4292944877" sldId="257"/>
+            <ac:spMk id="4" creationId="{4A310ADA-F24F-4448-C028-CDC63D0692F7}"/>
+          </ac:spMkLst>
+        </pc:spChg>
+        <pc:spChg chg="mod">
+          <ac:chgData name="André Amado" userId="cf82f2dece387b4b" providerId="LiveId" clId="{F5A71E99-14EB-40F5-B0A3-E2EF87BEEE38}" dt="2024-10-14T15:09:18.153" v="18" actId="164"/>
+          <ac:spMkLst>
+            <pc:docMk/>
+            <pc:sldMk cId="4292944877" sldId="257"/>
+            <ac:spMk id="6" creationId="{D0324529-4B64-25C4-EA6B-1037D747BD55}"/>
+          </ac:spMkLst>
+        </pc:spChg>
+        <pc:spChg chg="mod">
+          <ac:chgData name="André Amado" userId="cf82f2dece387b4b" providerId="LiveId" clId="{F5A71E99-14EB-40F5-B0A3-E2EF87BEEE38}" dt="2024-10-14T15:09:18.153" v="18" actId="164"/>
+          <ac:spMkLst>
+            <pc:docMk/>
+            <pc:sldMk cId="4292944877" sldId="257"/>
+            <ac:spMk id="8" creationId="{892C6EA6-1483-C619-891E-E8E9FC3FB50A}"/>
+          </ac:spMkLst>
+        </pc:spChg>
+        <pc:spChg chg="mod">
+          <ac:chgData name="André Amado" userId="cf82f2dece387b4b" providerId="LiveId" clId="{F5A71E99-14EB-40F5-B0A3-E2EF87BEEE38}" dt="2024-10-14T15:09:18.153" v="18" actId="164"/>
+          <ac:spMkLst>
+            <pc:docMk/>
+            <pc:sldMk cId="4292944877" sldId="257"/>
+            <ac:spMk id="18" creationId="{9B4F5F53-591E-2044-DE0D-658F85152029}"/>
+          </ac:spMkLst>
+        </pc:spChg>
+        <pc:grpChg chg="add mod">
+          <ac:chgData name="André Amado" userId="cf82f2dece387b4b" providerId="LiveId" clId="{F5A71E99-14EB-40F5-B0A3-E2EF87BEEE38}" dt="2024-10-14T15:09:18.153" v="18" actId="164"/>
+          <ac:grpSpMkLst>
+            <pc:docMk/>
+            <pc:sldMk cId="4292944877" sldId="257"/>
+            <ac:grpSpMk id="7" creationId="{973751BF-10E9-D14F-C9DB-3B8973CEF061}"/>
+          </ac:grpSpMkLst>
+        </pc:grpChg>
+        <pc:picChg chg="mod">
+          <ac:chgData name="André Amado" userId="cf82f2dece387b4b" providerId="LiveId" clId="{F5A71E99-14EB-40F5-B0A3-E2EF87BEEE38}" dt="2024-10-14T15:09:18.153" v="18" actId="164"/>
+          <ac:picMkLst>
+            <pc:docMk/>
+            <pc:sldMk cId="4292944877" sldId="257"/>
+            <ac:picMk id="2" creationId="{16985920-EEC3-C58A-AAD9-ADBAC23356D6}"/>
+          </ac:picMkLst>
+        </pc:picChg>
+        <pc:picChg chg="mod">
+          <ac:chgData name="André Amado" userId="cf82f2dece387b4b" providerId="LiveId" clId="{F5A71E99-14EB-40F5-B0A3-E2EF87BEEE38}" dt="2024-10-14T15:09:18.153" v="18" actId="164"/>
+          <ac:picMkLst>
+            <pc:docMk/>
+            <pc:sldMk cId="4292944877" sldId="257"/>
+            <ac:picMk id="3" creationId="{F50EA528-66B4-7756-462C-2CF4B016231F}"/>
+          </ac:picMkLst>
+        </pc:picChg>
+        <pc:picChg chg="mod">
+          <ac:chgData name="André Amado" userId="cf82f2dece387b4b" providerId="LiveId" clId="{F5A71E99-14EB-40F5-B0A3-E2EF87BEEE38}" dt="2024-10-14T15:09:18.153" v="18" actId="164"/>
+          <ac:picMkLst>
+            <pc:docMk/>
+            <pc:sldMk cId="4292944877" sldId="257"/>
+            <ac:picMk id="5" creationId="{F55CEE36-FD9D-BF5C-1917-ADD97CE4188D}"/>
+          </ac:picMkLst>
+        </pc:picChg>
+        <pc:picChg chg="mod">
+          <ac:chgData name="André Amado" userId="cf82f2dece387b4b" providerId="LiveId" clId="{F5A71E99-14EB-40F5-B0A3-E2EF87BEEE38}" dt="2024-10-14T15:09:18.153" v="18" actId="164"/>
+          <ac:picMkLst>
+            <pc:docMk/>
+            <pc:sldMk cId="4292944877" sldId="257"/>
+            <ac:picMk id="13" creationId="{241B2004-42D2-A60D-A014-F0FFA676CFC9}"/>
+          </ac:picMkLst>
+        </pc:picChg>
+        <pc:picChg chg="mod">
+          <ac:chgData name="André Amado" userId="cf82f2dece387b4b" providerId="LiveId" clId="{F5A71E99-14EB-40F5-B0A3-E2EF87BEEE38}" dt="2024-10-14T15:09:18.153" v="18" actId="164"/>
+          <ac:picMkLst>
+            <pc:docMk/>
+            <pc:sldMk cId="4292944877" sldId="257"/>
+            <ac:picMk id="15" creationId="{B09D658B-C00A-6FAE-8B9D-12B729B7B424}"/>
+          </ac:picMkLst>
+        </pc:picChg>
+        <pc:picChg chg="mod">
+          <ac:chgData name="André Amado" userId="cf82f2dece387b4b" providerId="LiveId" clId="{F5A71E99-14EB-40F5-B0A3-E2EF87BEEE38}" dt="2024-10-14T15:09:18.153" v="18" actId="164"/>
+          <ac:picMkLst>
+            <pc:docMk/>
+            <pc:sldMk cId="4292944877" sldId="257"/>
+            <ac:picMk id="22" creationId="{C0958E54-135B-B613-5CED-AFCBFA345576}"/>
+          </ac:picMkLst>
+        </pc:picChg>
+        <pc:cxnChg chg="mod">
+          <ac:chgData name="André Amado" userId="cf82f2dece387b4b" providerId="LiveId" clId="{F5A71E99-14EB-40F5-B0A3-E2EF87BEEE38}" dt="2024-10-14T15:09:18.153" v="18" actId="164"/>
+          <ac:cxnSpMkLst>
+            <pc:docMk/>
+            <pc:sldMk cId="4292944877" sldId="257"/>
+            <ac:cxnSpMk id="10" creationId="{4DDB112F-B9DA-122B-B3E6-FCB3269EF70A}"/>
+          </ac:cxnSpMkLst>
+        </pc:cxnChg>
+        <pc:cxnChg chg="mod">
+          <ac:chgData name="André Amado" userId="cf82f2dece387b4b" providerId="LiveId" clId="{F5A71E99-14EB-40F5-B0A3-E2EF87BEEE38}" dt="2024-10-14T15:09:18.153" v="18" actId="164"/>
+          <ac:cxnSpMkLst>
+            <pc:docMk/>
+            <pc:sldMk cId="4292944877" sldId="257"/>
+            <ac:cxnSpMk id="11" creationId="{FA02679D-C145-9AB8-9DF7-C8FD101A8E6A}"/>
+          </ac:cxnSpMkLst>
+        </pc:cxnChg>
       </pc:sldChg>
     </pc:docChg>
   </pc:docChgLst>
@@ -3014,473 +3142,544 @@
           <a:chExt cx="0" cy="0"/>
         </a:xfrm>
       </p:grpSpPr>
-      <p:sp>
-        <p:nvSpPr>
-          <p:cNvPr id="18" name="Rectangle 17">
+      <p:grpSp>
+        <p:nvGrpSpPr>
+          <p:cNvPr id="7" name="Agrupar 6">
             <a:extLst>
               <a:ext uri="{FF2B5EF4-FFF2-40B4-BE49-F238E27FC236}">
-                <a16:creationId xmlns:a16="http://schemas.microsoft.com/office/drawing/2014/main" id="{9B4F5F53-591E-2044-DE0D-658F85152029}"/>
+                <a16:creationId xmlns:a16="http://schemas.microsoft.com/office/drawing/2014/main" id="{973751BF-10E9-D14F-C9DB-3B8973CEF061}"/>
               </a:ext>
             </a:extLst>
           </p:cNvPr>
-          <p:cNvSpPr/>
+          <p:cNvGrpSpPr/>
           <p:nvPr/>
-        </p:nvSpPr>
-        <p:spPr>
+        </p:nvGrpSpPr>
+        <p:grpSpPr>
           <a:xfrm>
-            <a:off x="0" y="1643928"/>
-            <a:ext cx="2663825" cy="1223657"/>
+            <a:off x="0" y="0"/>
+            <a:ext cx="2663825" cy="3779838"/>
+            <a:chOff x="0" y="0"/>
+            <a:chExt cx="2663825" cy="3779838"/>
           </a:xfrm>
-          <a:prstGeom prst="rect">
-            <a:avLst/>
-          </a:prstGeom>
-          <a:solidFill>
-            <a:schemeClr val="bg1">
-              <a:lumMod val="85000"/>
-            </a:schemeClr>
-          </a:solidFill>
-          <a:ln>
+        </p:grpSpPr>
+        <p:sp>
+          <p:nvSpPr>
+            <p:cNvPr id="18" name="Rectangle 17">
+              <a:extLst>
+                <a:ext uri="{FF2B5EF4-FFF2-40B4-BE49-F238E27FC236}">
+                  <a16:creationId xmlns:a16="http://schemas.microsoft.com/office/drawing/2014/main" id="{9B4F5F53-591E-2044-DE0D-658F85152029}"/>
+                </a:ext>
+              </a:extLst>
+            </p:cNvPr>
+            <p:cNvSpPr/>
+            <p:nvPr/>
+          </p:nvSpPr>
+          <p:spPr>
+            <a:xfrm>
+              <a:off x="0" y="1632426"/>
+              <a:ext cx="2663825" cy="1232979"/>
+            </a:xfrm>
+            <a:prstGeom prst="rect">
+              <a:avLst/>
+            </a:prstGeom>
+            <a:solidFill>
+              <a:schemeClr val="bg1">
+                <a:lumMod val="85000"/>
+              </a:schemeClr>
+            </a:solidFill>
+            <a:ln>
+              <a:noFill/>
+            </a:ln>
+          </p:spPr>
+          <p:style>
+            <a:lnRef idx="2">
+              <a:schemeClr val="dk1"/>
+            </a:lnRef>
+            <a:fillRef idx="1">
+              <a:schemeClr val="lt1"/>
+            </a:fillRef>
+            <a:effectRef idx="0">
+              <a:schemeClr val="dk1"/>
+            </a:effectRef>
+            <a:fontRef idx="minor">
+              <a:schemeClr val="dk1"/>
+            </a:fontRef>
+          </p:style>
+          <p:txBody>
+            <a:bodyPr rtlCol="0" anchor="ctr"/>
+            <a:lstStyle/>
+            <a:p>
+              <a:pPr algn="ctr"/>
+              <a:endParaRPr lang="en-US" sz="2592"/>
+            </a:p>
+          </p:txBody>
+        </p:sp>
+        <p:pic>
+          <p:nvPicPr>
+            <p:cNvPr id="5" name="Picture 4" descr="A poster with different animals&#10;&#10;Description automatically generated with medium confidence">
+              <a:extLst>
+                <a:ext uri="{FF2B5EF4-FFF2-40B4-BE49-F238E27FC236}">
+                  <a16:creationId xmlns:a16="http://schemas.microsoft.com/office/drawing/2014/main" id="{F55CEE36-FD9D-BF5C-1917-ADD97CE4188D}"/>
+                </a:ext>
+              </a:extLst>
+            </p:cNvPr>
+            <p:cNvPicPr>
+              <a:picLocks noChangeAspect="1"/>
+            </p:cNvPicPr>
+            <p:nvPr/>
+          </p:nvPicPr>
+          <p:blipFill>
+            <a:blip r:embed="rId2"/>
+            <a:stretch>
+              <a:fillRect/>
+            </a:stretch>
+          </p:blipFill>
+          <p:spPr>
+            <a:xfrm>
+              <a:off x="677090" y="97545"/>
+              <a:ext cx="1309632" cy="1546384"/>
+            </a:xfrm>
+            <a:prstGeom prst="rect">
+              <a:avLst/>
+            </a:prstGeom>
+          </p:spPr>
+        </p:pic>
+        <p:sp>
+          <p:nvSpPr>
+            <p:cNvPr id="6" name="TextBox 5">
+              <a:extLst>
+                <a:ext uri="{FF2B5EF4-FFF2-40B4-BE49-F238E27FC236}">
+                  <a16:creationId xmlns:a16="http://schemas.microsoft.com/office/drawing/2014/main" id="{D0324529-4B64-25C4-EA6B-1037D747BD55}"/>
+                </a:ext>
+              </a:extLst>
+            </p:cNvPr>
+            <p:cNvSpPr txBox="1"/>
+            <p:nvPr/>
+          </p:nvSpPr>
+          <p:spPr>
+            <a:xfrm>
+              <a:off x="323723" y="1667038"/>
+              <a:ext cx="2016371" cy="1177438"/>
+            </a:xfrm>
+            <a:prstGeom prst="rect">
+              <a:avLst/>
+            </a:prstGeom>
             <a:noFill/>
-          </a:ln>
-        </p:spPr>
-        <p:style>
-          <a:lnRef idx="2">
-            <a:schemeClr val="dk1"/>
-          </a:lnRef>
-          <a:fillRef idx="1">
-            <a:schemeClr val="lt1"/>
-          </a:fillRef>
-          <a:effectRef idx="0">
-            <a:schemeClr val="dk1"/>
-          </a:effectRef>
-          <a:fontRef idx="minor">
-            <a:schemeClr val="dk1"/>
-          </a:fontRef>
-        </p:style>
-        <p:txBody>
-          <a:bodyPr rtlCol="0" anchor="ctr"/>
-          <a:lstStyle/>
-          <a:p>
-            <a:pPr algn="ctr"/>
-            <a:endParaRPr lang="en-US" sz="2592"/>
-          </a:p>
-        </p:txBody>
-      </p:sp>
-      <p:pic>
-        <p:nvPicPr>
-          <p:cNvPr id="5" name="Picture 4" descr="A poster with different animals&#10;&#10;Description automatically generated with medium confidence">
+          </p:spPr>
+          <p:txBody>
+            <a:bodyPr wrap="square" rtlCol="0">
+              <a:spAutoFit/>
+            </a:bodyPr>
+            <a:lstStyle/>
+            <a:p>
+              <a:pPr algn="ctr"/>
+              <a:r>
+                <a:rPr lang="en-US" sz="2592" b="1" dirty="0">
+                  <a:latin typeface="Helvetica" pitchFamily="2" charset="0"/>
+                </a:rPr>
+                <a:t>NOME</a:t>
+              </a:r>
+            </a:p>
+            <a:p>
+              <a:pPr algn="ctr"/>
+              <a:r>
+                <a:rPr lang="en-US" sz="2592" b="1" dirty="0">
+                  <a:latin typeface="Helvetica" pitchFamily="2" charset="0"/>
+                </a:rPr>
+                <a:t>APELIDO</a:t>
+              </a:r>
+            </a:p>
+            <a:p>
+              <a:pPr algn="ctr"/>
+              <a:endParaRPr lang="en-US" sz="700" b="1" dirty="0">
+                <a:latin typeface="Helvetica" pitchFamily="2" charset="0"/>
+              </a:endParaRPr>
+            </a:p>
+            <a:p>
+              <a:pPr algn="ctr"/>
+              <a:r>
+                <a:rPr lang="en-US" sz="1167" b="1" dirty="0">
+                  <a:latin typeface="Helvetica" pitchFamily="2" charset="0"/>
+                </a:rPr>
+                <a:t>INSTITUIÇÃO</a:t>
+              </a:r>
+              <a:endParaRPr lang="en-US" sz="700" b="1" dirty="0">
+                <a:latin typeface="Helvetica" pitchFamily="2" charset="0"/>
+              </a:endParaRPr>
+            </a:p>
+          </p:txBody>
+        </p:sp>
+        <p:sp>
+          <p:nvSpPr>
+            <p:cNvPr id="8" name="TextBox 7">
+              <a:extLst>
+                <a:ext uri="{FF2B5EF4-FFF2-40B4-BE49-F238E27FC236}">
+                  <a16:creationId xmlns:a16="http://schemas.microsoft.com/office/drawing/2014/main" id="{892C6EA6-1483-C619-891E-E8E9FC3FB50A}"/>
+                </a:ext>
+              </a:extLst>
+            </p:cNvPr>
+            <p:cNvSpPr txBox="1"/>
+            <p:nvPr/>
+          </p:nvSpPr>
+          <p:spPr>
+            <a:xfrm>
+              <a:off x="177219" y="2920545"/>
+              <a:ext cx="2309387" cy="388504"/>
+            </a:xfrm>
+            <a:prstGeom prst="rect">
+              <a:avLst/>
+            </a:prstGeom>
+            <a:noFill/>
+          </p:spPr>
+          <p:txBody>
+            <a:bodyPr wrap="square" rtlCol="0">
+              <a:spAutoFit/>
+            </a:bodyPr>
+            <a:lstStyle/>
+            <a:p>
+              <a:pPr algn="ctr"/>
+              <a:r>
+                <a:rPr lang="en-US" sz="817" dirty="0">
+                  <a:latin typeface="Helvetica Light" panose="020B0403020202020204" pitchFamily="34" charset="0"/>
+                </a:rPr>
+                <a:t>VILA DO CONDE, PORTUGAL</a:t>
+              </a:r>
+            </a:p>
+            <a:p>
+              <a:pPr algn="ctr">
+                <a:lnSpc>
+                  <a:spcPct val="150000"/>
+                </a:lnSpc>
+              </a:pPr>
+              <a:r>
+                <a:rPr lang="en-US" sz="817" dirty="0">
+                  <a:latin typeface="Helvetica Light" panose="020B0403020202020204" pitchFamily="34" charset="0"/>
+                </a:rPr>
+                <a:t>21-23.11.2024</a:t>
+              </a:r>
+            </a:p>
+          </p:txBody>
+        </p:sp>
+        <p:cxnSp>
+          <p:nvCxnSpPr>
+            <p:cNvPr id="10" name="Straight Connector 9">
+              <a:extLst>
+                <a:ext uri="{FF2B5EF4-FFF2-40B4-BE49-F238E27FC236}">
+                  <a16:creationId xmlns:a16="http://schemas.microsoft.com/office/drawing/2014/main" id="{4DDB112F-B9DA-122B-B3E6-FCB3269EF70A}"/>
+                </a:ext>
+              </a:extLst>
+            </p:cNvPr>
+            <p:cNvCxnSpPr>
+              <a:cxnSpLocks/>
+            </p:cNvCxnSpPr>
+            <p:nvPr/>
+          </p:nvCxnSpPr>
+          <p:spPr>
+            <a:xfrm>
+              <a:off x="0" y="1619062"/>
+              <a:ext cx="2663825" cy="0"/>
+            </a:xfrm>
+            <a:prstGeom prst="line">
+              <a:avLst/>
+            </a:prstGeom>
+          </p:spPr>
+          <p:style>
+            <a:lnRef idx="2">
+              <a:schemeClr val="dk1"/>
+            </a:lnRef>
+            <a:fillRef idx="0">
+              <a:schemeClr val="dk1"/>
+            </a:fillRef>
+            <a:effectRef idx="1">
+              <a:schemeClr val="dk1"/>
+            </a:effectRef>
+            <a:fontRef idx="minor">
+              <a:schemeClr val="tx1"/>
+            </a:fontRef>
+          </p:style>
+        </p:cxnSp>
+        <p:cxnSp>
+          <p:nvCxnSpPr>
+            <p:cNvPr id="11" name="Straight Connector 10">
+              <a:extLst>
+                <a:ext uri="{FF2B5EF4-FFF2-40B4-BE49-F238E27FC236}">
+                  <a16:creationId xmlns:a16="http://schemas.microsoft.com/office/drawing/2014/main" id="{FA02679D-C145-9AB8-9DF7-C8FD101A8E6A}"/>
+                </a:ext>
+              </a:extLst>
+            </p:cNvPr>
+            <p:cNvCxnSpPr>
+              <a:cxnSpLocks/>
+            </p:cNvCxnSpPr>
+            <p:nvPr/>
+          </p:nvCxnSpPr>
+          <p:spPr>
+            <a:xfrm>
+              <a:off x="0" y="2867587"/>
+              <a:ext cx="2663825" cy="0"/>
+            </a:xfrm>
+            <a:prstGeom prst="line">
+              <a:avLst/>
+            </a:prstGeom>
+          </p:spPr>
+          <p:style>
+            <a:lnRef idx="2">
+              <a:schemeClr val="dk1"/>
+            </a:lnRef>
+            <a:fillRef idx="0">
+              <a:schemeClr val="dk1"/>
+            </a:fillRef>
+            <a:effectRef idx="1">
+              <a:schemeClr val="dk1"/>
+            </a:effectRef>
+            <a:fontRef idx="minor">
+              <a:schemeClr val="tx1"/>
+            </a:fontRef>
+          </p:style>
+        </p:cxnSp>
+        <p:pic>
+          <p:nvPicPr>
+            <p:cNvPr id="2" name="Picture 2" descr="APP logo">
+              <a:extLst>
+                <a:ext uri="{FF2B5EF4-FFF2-40B4-BE49-F238E27FC236}">
+                  <a16:creationId xmlns:a16="http://schemas.microsoft.com/office/drawing/2014/main" id="{16985920-EEC3-C58A-AAD9-ADBAC23356D6}"/>
+                </a:ext>
+              </a:extLst>
+            </p:cNvPr>
+            <p:cNvPicPr>
+              <a:picLocks noChangeAspect="1" noChangeArrowheads="1"/>
+            </p:cNvPicPr>
+            <p:nvPr/>
+          </p:nvPicPr>
+          <p:blipFill>
+            <a:blip r:embed="rId3">
+              <a:extLst>
+                <a:ext uri="{BEBA8EAE-BF5A-486C-A8C5-ECC9F3942E4B}">
+                  <a14:imgProps xmlns:a14="http://schemas.microsoft.com/office/drawing/2010/main">
+                    <a14:imgLayer r:embed="rId4">
+                      <a14:imgEffect>
+                        <a14:saturation sat="0"/>
+                      </a14:imgEffect>
+                    </a14:imgLayer>
+                  </a14:imgProps>
+                </a:ext>
+                <a:ext uri="{28A0092B-C50C-407E-A947-70E740481C1C}">
+                  <a14:useLocalDpi xmlns:a14="http://schemas.microsoft.com/office/drawing/2010/main" val="0"/>
+                </a:ext>
+              </a:extLst>
+            </a:blip>
+            <a:srcRect/>
+            <a:stretch>
+              <a:fillRect/>
+            </a:stretch>
+          </p:blipFill>
+          <p:spPr bwMode="auto">
+            <a:xfrm>
+              <a:off x="777871" y="3430712"/>
+              <a:ext cx="334635" cy="349126"/>
+            </a:xfrm>
+            <a:prstGeom prst="rect">
+              <a:avLst/>
+            </a:prstGeom>
+            <a:noFill/>
             <a:extLst>
-              <a:ext uri="{FF2B5EF4-FFF2-40B4-BE49-F238E27FC236}">
-                <a16:creationId xmlns:a16="http://schemas.microsoft.com/office/drawing/2014/main" id="{F55CEE36-FD9D-BF5C-1917-ADD97CE4188D}"/>
+              <a:ext uri="{909E8E84-426E-40DD-AFC4-6F175D3DCCD1}">
+                <a14:hiddenFill xmlns:a14="http://schemas.microsoft.com/office/drawing/2010/main">
+                  <a:solidFill>
+                    <a:srgbClr val="FFFFFF"/>
+                  </a:solidFill>
+                </a14:hiddenFill>
               </a:ext>
             </a:extLst>
-          </p:cNvPr>
-          <p:cNvPicPr>
-            <a:picLocks noChangeAspect="1"/>
-          </p:cNvPicPr>
-          <p:nvPr/>
-        </p:nvPicPr>
-        <p:blipFill>
-          <a:blip r:embed="rId2"/>
-          <a:stretch>
-            <a:fillRect/>
-          </a:stretch>
-        </p:blipFill>
-        <p:spPr>
-          <a:xfrm>
-            <a:off x="677090" y="97545"/>
-            <a:ext cx="1309632" cy="1546384"/>
-          </a:xfrm>
-          <a:prstGeom prst="rect">
-            <a:avLst/>
-          </a:prstGeom>
-        </p:spPr>
-      </p:pic>
-      <p:sp>
-        <p:nvSpPr>
-          <p:cNvPr id="6" name="TextBox 5">
+          </p:spPr>
+        </p:pic>
+        <p:pic>
+          <p:nvPicPr>
+            <p:cNvPr id="3" name="Picture 4">
+              <a:extLst>
+                <a:ext uri="{FF2B5EF4-FFF2-40B4-BE49-F238E27FC236}">
+                  <a16:creationId xmlns:a16="http://schemas.microsoft.com/office/drawing/2014/main" id="{F50EA528-66B4-7756-462C-2CF4B016231F}"/>
+                </a:ext>
+              </a:extLst>
+            </p:cNvPr>
+            <p:cNvPicPr>
+              <a:picLocks noChangeAspect="1" noChangeArrowheads="1"/>
+            </p:cNvPicPr>
+            <p:nvPr/>
+          </p:nvPicPr>
+          <p:blipFill>
+            <a:blip r:embed="rId5">
+              <a:extLst>
+                <a:ext uri="{28A0092B-C50C-407E-A947-70E740481C1C}">
+                  <a14:useLocalDpi xmlns:a14="http://schemas.microsoft.com/office/drawing/2010/main" val="0"/>
+                </a:ext>
+              </a:extLst>
+            </a:blip>
+            <a:srcRect/>
+            <a:stretch>
+              <a:fillRect/>
+            </a:stretch>
+          </p:blipFill>
+          <p:spPr bwMode="auto">
+            <a:xfrm>
+              <a:off x="102582" y="3464710"/>
+              <a:ext cx="546780" cy="292903"/>
+            </a:xfrm>
+            <a:prstGeom prst="rect">
+              <a:avLst/>
+            </a:prstGeom>
+            <a:noFill/>
             <a:extLst>
-              <a:ext uri="{FF2B5EF4-FFF2-40B4-BE49-F238E27FC236}">
-                <a16:creationId xmlns:a16="http://schemas.microsoft.com/office/drawing/2014/main" id="{D0324529-4B64-25C4-EA6B-1037D747BD55}"/>
+              <a:ext uri="{909E8E84-426E-40DD-AFC4-6F175D3DCCD1}">
+                <a14:hiddenFill xmlns:a14="http://schemas.microsoft.com/office/drawing/2010/main">
+                  <a:solidFill>
+                    <a:srgbClr val="FFFFFF"/>
+                  </a:solidFill>
+                </a14:hiddenFill>
               </a:ext>
             </a:extLst>
-          </p:cNvPr>
-          <p:cNvSpPr txBox="1"/>
-          <p:nvPr/>
-        </p:nvSpPr>
-        <p:spPr>
-          <a:xfrm>
-            <a:off x="323723" y="1667038"/>
-            <a:ext cx="2016371" cy="1177438"/>
-          </a:xfrm>
-          <a:prstGeom prst="rect">
-            <a:avLst/>
-          </a:prstGeom>
-          <a:noFill/>
-        </p:spPr>
-        <p:txBody>
-          <a:bodyPr wrap="square" rtlCol="0">
-            <a:spAutoFit/>
-          </a:bodyPr>
-          <a:lstStyle/>
-          <a:p>
-            <a:pPr algn="ctr"/>
-            <a:r>
-              <a:rPr lang="en-US" sz="2592" b="1" dirty="0">
-                <a:latin typeface="Helvetica" pitchFamily="2" charset="0"/>
-              </a:rPr>
-              <a:t>NOME</a:t>
-            </a:r>
-          </a:p>
-          <a:p>
-            <a:pPr algn="ctr"/>
-            <a:r>
-              <a:rPr lang="en-US" sz="2592" b="1" dirty="0">
-                <a:latin typeface="Helvetica" pitchFamily="2" charset="0"/>
-              </a:rPr>
-              <a:t>APELIDO</a:t>
-            </a:r>
-          </a:p>
-          <a:p>
-            <a:pPr algn="ctr"/>
-            <a:endParaRPr lang="en-US" sz="700" b="1" dirty="0">
-              <a:latin typeface="Helvetica" pitchFamily="2" charset="0"/>
-            </a:endParaRPr>
-          </a:p>
-          <a:p>
-            <a:pPr algn="ctr"/>
-            <a:r>
-              <a:rPr lang="en-US" sz="1167" b="1" dirty="0">
-                <a:latin typeface="Helvetica" pitchFamily="2" charset="0"/>
-              </a:rPr>
-              <a:t>INSTITUIÇÃO</a:t>
-            </a:r>
-            <a:endParaRPr lang="en-US" sz="700" b="1" dirty="0">
-              <a:latin typeface="Helvetica" pitchFamily="2" charset="0"/>
-            </a:endParaRPr>
-          </a:p>
-        </p:txBody>
-      </p:sp>
-      <p:sp>
-        <p:nvSpPr>
-          <p:cNvPr id="8" name="TextBox 7">
-            <a:extLst>
-              <a:ext uri="{FF2B5EF4-FFF2-40B4-BE49-F238E27FC236}">
-                <a16:creationId xmlns:a16="http://schemas.microsoft.com/office/drawing/2014/main" id="{892C6EA6-1483-C619-891E-E8E9FC3FB50A}"/>
-              </a:ext>
-            </a:extLst>
-          </p:cNvPr>
-          <p:cNvSpPr txBox="1"/>
-          <p:nvPr/>
-        </p:nvSpPr>
-        <p:spPr>
-          <a:xfrm>
-            <a:off x="177219" y="2920545"/>
-            <a:ext cx="2309387" cy="388504"/>
-          </a:xfrm>
-          <a:prstGeom prst="rect">
-            <a:avLst/>
-          </a:prstGeom>
-          <a:noFill/>
-        </p:spPr>
-        <p:txBody>
-          <a:bodyPr wrap="square" rtlCol="0">
-            <a:spAutoFit/>
-          </a:bodyPr>
-          <a:lstStyle/>
-          <a:p>
-            <a:pPr algn="ctr"/>
-            <a:r>
-              <a:rPr lang="en-US" sz="817" dirty="0">
-                <a:latin typeface="Helvetica Light" panose="020B0403020202020204" pitchFamily="34" charset="0"/>
-              </a:rPr>
-              <a:t>VILA DO CONDE, PORTUGAL</a:t>
-            </a:r>
-          </a:p>
-          <a:p>
-            <a:pPr algn="ctr">
-              <a:lnSpc>
-                <a:spcPct val="150000"/>
-              </a:lnSpc>
-            </a:pPr>
-            <a:r>
-              <a:rPr lang="en-US" sz="817" dirty="0">
-                <a:latin typeface="Helvetica Light" panose="020B0403020202020204" pitchFamily="34" charset="0"/>
-              </a:rPr>
-              <a:t>21-23.11.2024</a:t>
-            </a:r>
-          </a:p>
-        </p:txBody>
-      </p:sp>
-      <p:cxnSp>
-        <p:nvCxnSpPr>
-          <p:cNvPr id="10" name="Straight Connector 9">
-            <a:extLst>
-              <a:ext uri="{FF2B5EF4-FFF2-40B4-BE49-F238E27FC236}">
-                <a16:creationId xmlns:a16="http://schemas.microsoft.com/office/drawing/2014/main" id="{4DDB112F-B9DA-122B-B3E6-FCB3269EF70A}"/>
-              </a:ext>
-            </a:extLst>
-          </p:cNvPr>
-          <p:cNvCxnSpPr>
-            <a:cxnSpLocks/>
-          </p:cNvCxnSpPr>
-          <p:nvPr/>
-        </p:nvCxnSpPr>
-        <p:spPr>
-          <a:xfrm>
-            <a:off x="0" y="1619062"/>
-            <a:ext cx="2663825" cy="0"/>
-          </a:xfrm>
-          <a:prstGeom prst="line">
-            <a:avLst/>
-          </a:prstGeom>
-        </p:spPr>
-        <p:style>
-          <a:lnRef idx="2">
-            <a:schemeClr val="dk1"/>
-          </a:lnRef>
-          <a:fillRef idx="0">
-            <a:schemeClr val="dk1"/>
-          </a:fillRef>
-          <a:effectRef idx="1">
-            <a:schemeClr val="dk1"/>
-          </a:effectRef>
-          <a:fontRef idx="minor">
-            <a:schemeClr val="tx1"/>
-          </a:fontRef>
-        </p:style>
-      </p:cxnSp>
-      <p:cxnSp>
-        <p:nvCxnSpPr>
-          <p:cNvPr id="11" name="Straight Connector 10">
-            <a:extLst>
-              <a:ext uri="{FF2B5EF4-FFF2-40B4-BE49-F238E27FC236}">
-                <a16:creationId xmlns:a16="http://schemas.microsoft.com/office/drawing/2014/main" id="{FA02679D-C145-9AB8-9DF7-C8FD101A8E6A}"/>
-              </a:ext>
-            </a:extLst>
-          </p:cNvPr>
-          <p:cNvCxnSpPr>
-            <a:cxnSpLocks/>
-          </p:cNvCxnSpPr>
-          <p:nvPr/>
-        </p:nvCxnSpPr>
-        <p:spPr>
-          <a:xfrm>
-            <a:off x="0" y="2867587"/>
-            <a:ext cx="2663825" cy="0"/>
-          </a:xfrm>
-          <a:prstGeom prst="line">
-            <a:avLst/>
-          </a:prstGeom>
-        </p:spPr>
-        <p:style>
-          <a:lnRef idx="2">
-            <a:schemeClr val="dk1"/>
-          </a:lnRef>
-          <a:fillRef idx="0">
-            <a:schemeClr val="dk1"/>
-          </a:fillRef>
-          <a:effectRef idx="1">
-            <a:schemeClr val="dk1"/>
-          </a:effectRef>
-          <a:fontRef idx="minor">
-            <a:schemeClr val="tx1"/>
-          </a:fontRef>
-        </p:style>
-      </p:cxnSp>
-      <p:pic>
-        <p:nvPicPr>
-          <p:cNvPr id="2" name="Picture 2" descr="APP logo">
-            <a:extLst>
-              <a:ext uri="{FF2B5EF4-FFF2-40B4-BE49-F238E27FC236}">
-                <a16:creationId xmlns:a16="http://schemas.microsoft.com/office/drawing/2014/main" id="{16985920-EEC3-C58A-AAD9-ADBAC23356D6}"/>
-              </a:ext>
-            </a:extLst>
-          </p:cNvPr>
-          <p:cNvPicPr>
-            <a:picLocks noChangeAspect="1" noChangeArrowheads="1"/>
-          </p:cNvPicPr>
-          <p:nvPr/>
-        </p:nvPicPr>
-        <p:blipFill>
-          <a:blip r:embed="rId3">
-            <a:extLst>
-              <a:ext uri="{BEBA8EAE-BF5A-486C-A8C5-ECC9F3942E4B}">
-                <a14:imgProps xmlns:a14="http://schemas.microsoft.com/office/drawing/2010/main">
-                  <a14:imgLayer r:embed="rId4">
-                    <a14:imgEffect>
-                      <a14:saturation sat="0"/>
-                    </a14:imgEffect>
-                  </a14:imgLayer>
-                </a14:imgProps>
-              </a:ext>
-              <a:ext uri="{28A0092B-C50C-407E-A947-70E740481C1C}">
-                <a14:useLocalDpi xmlns:a14="http://schemas.microsoft.com/office/drawing/2010/main" val="0"/>
-              </a:ext>
-            </a:extLst>
-          </a:blip>
-          <a:srcRect/>
-          <a:stretch>
-            <a:fillRect/>
-          </a:stretch>
-        </p:blipFill>
-        <p:spPr bwMode="auto">
-          <a:xfrm>
-            <a:off x="777871" y="3430712"/>
-            <a:ext cx="334635" cy="349126"/>
-          </a:xfrm>
-          <a:prstGeom prst="rect">
-            <a:avLst/>
-          </a:prstGeom>
-          <a:noFill/>
-          <a:extLst>
-            <a:ext uri="{909E8E84-426E-40DD-AFC4-6F175D3DCCD1}">
-              <a14:hiddenFill xmlns:a14="http://schemas.microsoft.com/office/drawing/2010/main">
-                <a:solidFill>
-                  <a:srgbClr val="FFFFFF"/>
-                </a:solidFill>
-              </a14:hiddenFill>
-            </a:ext>
-          </a:extLst>
-        </p:spPr>
-      </p:pic>
-      <p:pic>
-        <p:nvPicPr>
-          <p:cNvPr id="3" name="Picture 4">
-            <a:extLst>
-              <a:ext uri="{FF2B5EF4-FFF2-40B4-BE49-F238E27FC236}">
-                <a16:creationId xmlns:a16="http://schemas.microsoft.com/office/drawing/2014/main" id="{F50EA528-66B4-7756-462C-2CF4B016231F}"/>
-              </a:ext>
-            </a:extLst>
-          </p:cNvPr>
-          <p:cNvPicPr>
-            <a:picLocks noChangeAspect="1" noChangeArrowheads="1"/>
-          </p:cNvPicPr>
-          <p:nvPr/>
-        </p:nvPicPr>
-        <p:blipFill>
-          <a:blip r:embed="rId5">
-            <a:extLst>
-              <a:ext uri="{28A0092B-C50C-407E-A947-70E740481C1C}">
-                <a14:useLocalDpi xmlns:a14="http://schemas.microsoft.com/office/drawing/2010/main" val="0"/>
-              </a:ext>
-            </a:extLst>
-          </a:blip>
-          <a:srcRect/>
-          <a:stretch>
-            <a:fillRect/>
-          </a:stretch>
-        </p:blipFill>
-        <p:spPr bwMode="auto">
-          <a:xfrm>
-            <a:off x="102582" y="3464710"/>
-            <a:ext cx="546780" cy="292903"/>
-          </a:xfrm>
-          <a:prstGeom prst="rect">
-            <a:avLst/>
-          </a:prstGeom>
-          <a:noFill/>
-          <a:extLst>
-            <a:ext uri="{909E8E84-426E-40DD-AFC4-6F175D3DCCD1}">
-              <a14:hiddenFill xmlns:a14="http://schemas.microsoft.com/office/drawing/2010/main">
-                <a:solidFill>
-                  <a:srgbClr val="FFFFFF"/>
-                </a:solidFill>
-              </a14:hiddenFill>
-            </a:ext>
-          </a:extLst>
-        </p:spPr>
-      </p:pic>
-      <p:pic>
-        <p:nvPicPr>
-          <p:cNvPr id="13" name="Picture 12">
-            <a:extLst>
-              <a:ext uri="{FF2B5EF4-FFF2-40B4-BE49-F238E27FC236}">
-                <a16:creationId xmlns:a16="http://schemas.microsoft.com/office/drawing/2014/main" id="{241B2004-42D2-A60D-A014-F0FFA676CFC9}"/>
-              </a:ext>
-            </a:extLst>
-          </p:cNvPr>
-          <p:cNvPicPr>
-            <a:picLocks noChangeAspect="1"/>
-          </p:cNvPicPr>
-          <p:nvPr/>
-        </p:nvPicPr>
-        <p:blipFill>
-          <a:blip r:embed="rId6"/>
-          <a:stretch>
-            <a:fillRect/>
-          </a:stretch>
-        </p:blipFill>
-        <p:spPr>
-          <a:xfrm>
-            <a:off x="1773185" y="3409569"/>
-            <a:ext cx="261033" cy="369396"/>
-          </a:xfrm>
-          <a:prstGeom prst="rect">
-            <a:avLst/>
-          </a:prstGeom>
-        </p:spPr>
-      </p:pic>
-      <p:pic>
-        <p:nvPicPr>
-          <p:cNvPr id="15" name="Picture 14" descr="A logo for a biodiversity center&#10;&#10;Description automatically generated">
-            <a:extLst>
-              <a:ext uri="{FF2B5EF4-FFF2-40B4-BE49-F238E27FC236}">
-                <a16:creationId xmlns:a16="http://schemas.microsoft.com/office/drawing/2014/main" id="{B09D658B-C00A-6FAE-8B9D-12B729B7B424}"/>
-              </a:ext>
-            </a:extLst>
-          </p:cNvPr>
-          <p:cNvPicPr>
-            <a:picLocks noChangeAspect="1"/>
-          </p:cNvPicPr>
-          <p:nvPr/>
-        </p:nvPicPr>
-        <p:blipFill>
-          <a:blip r:embed="rId7"/>
-          <a:stretch>
-            <a:fillRect/>
-          </a:stretch>
-        </p:blipFill>
-        <p:spPr>
-          <a:xfrm>
-            <a:off x="1210510" y="3464710"/>
-            <a:ext cx="440701" cy="259115"/>
-          </a:xfrm>
-          <a:prstGeom prst="rect">
-            <a:avLst/>
-          </a:prstGeom>
-        </p:spPr>
-      </p:pic>
-      <p:pic>
-        <p:nvPicPr>
-          <p:cNvPr id="22" name="Picture 21" descr="A black and white flag with a boat and a crown&#10;&#10;Description automatically generated">
-            <a:extLst>
-              <a:ext uri="{FF2B5EF4-FFF2-40B4-BE49-F238E27FC236}">
-                <a16:creationId xmlns:a16="http://schemas.microsoft.com/office/drawing/2014/main" id="{C0958E54-135B-B613-5CED-AFCBFA345576}"/>
-              </a:ext>
-            </a:extLst>
-          </p:cNvPr>
-          <p:cNvPicPr>
-            <a:picLocks noChangeAspect="1"/>
-          </p:cNvPicPr>
-          <p:nvPr/>
-        </p:nvPicPr>
-        <p:blipFill>
-          <a:blip r:embed="rId8"/>
-          <a:stretch>
-            <a:fillRect/>
-          </a:stretch>
-        </p:blipFill>
-        <p:spPr>
-          <a:xfrm>
-            <a:off x="2132150" y="3443357"/>
-            <a:ext cx="439959" cy="314256"/>
-          </a:xfrm>
-          <a:prstGeom prst="rect">
-            <a:avLst/>
-          </a:prstGeom>
-        </p:spPr>
-      </p:pic>
+          </p:spPr>
+        </p:pic>
+        <p:pic>
+          <p:nvPicPr>
+            <p:cNvPr id="13" name="Picture 12">
+              <a:extLst>
+                <a:ext uri="{FF2B5EF4-FFF2-40B4-BE49-F238E27FC236}">
+                  <a16:creationId xmlns:a16="http://schemas.microsoft.com/office/drawing/2014/main" id="{241B2004-42D2-A60D-A014-F0FFA676CFC9}"/>
+                </a:ext>
+              </a:extLst>
+            </p:cNvPr>
+            <p:cNvPicPr>
+              <a:picLocks noChangeAspect="1"/>
+            </p:cNvPicPr>
+            <p:nvPr/>
+          </p:nvPicPr>
+          <p:blipFill>
+            <a:blip r:embed="rId6"/>
+            <a:stretch>
+              <a:fillRect/>
+            </a:stretch>
+          </p:blipFill>
+          <p:spPr>
+            <a:xfrm>
+              <a:off x="1773185" y="3409569"/>
+              <a:ext cx="261033" cy="369396"/>
+            </a:xfrm>
+            <a:prstGeom prst="rect">
+              <a:avLst/>
+            </a:prstGeom>
+          </p:spPr>
+        </p:pic>
+        <p:pic>
+          <p:nvPicPr>
+            <p:cNvPr id="15" name="Picture 14" descr="A logo for a biodiversity center&#10;&#10;Description automatically generated">
+              <a:extLst>
+                <a:ext uri="{FF2B5EF4-FFF2-40B4-BE49-F238E27FC236}">
+                  <a16:creationId xmlns:a16="http://schemas.microsoft.com/office/drawing/2014/main" id="{B09D658B-C00A-6FAE-8B9D-12B729B7B424}"/>
+                </a:ext>
+              </a:extLst>
+            </p:cNvPr>
+            <p:cNvPicPr>
+              <a:picLocks noChangeAspect="1"/>
+            </p:cNvPicPr>
+            <p:nvPr/>
+          </p:nvPicPr>
+          <p:blipFill>
+            <a:blip r:embed="rId7"/>
+            <a:stretch>
+              <a:fillRect/>
+            </a:stretch>
+          </p:blipFill>
+          <p:spPr>
+            <a:xfrm>
+              <a:off x="1210510" y="3464710"/>
+              <a:ext cx="440701" cy="259115"/>
+            </a:xfrm>
+            <a:prstGeom prst="rect">
+              <a:avLst/>
+            </a:prstGeom>
+          </p:spPr>
+        </p:pic>
+        <p:pic>
+          <p:nvPicPr>
+            <p:cNvPr id="22" name="Picture 21" descr="A black and white flag with a boat and a crown&#10;&#10;Description automatically generated">
+              <a:extLst>
+                <a:ext uri="{FF2B5EF4-FFF2-40B4-BE49-F238E27FC236}">
+                  <a16:creationId xmlns:a16="http://schemas.microsoft.com/office/drawing/2014/main" id="{C0958E54-135B-B613-5CED-AFCBFA345576}"/>
+                </a:ext>
+              </a:extLst>
+            </p:cNvPr>
+            <p:cNvPicPr>
+              <a:picLocks noChangeAspect="1"/>
+            </p:cNvPicPr>
+            <p:nvPr/>
+          </p:nvPicPr>
+          <p:blipFill>
+            <a:blip r:embed="rId8"/>
+            <a:stretch>
+              <a:fillRect/>
+            </a:stretch>
+          </p:blipFill>
+          <p:spPr>
+            <a:xfrm>
+              <a:off x="2132150" y="3443357"/>
+              <a:ext cx="439959" cy="314256"/>
+            </a:xfrm>
+            <a:prstGeom prst="rect">
+              <a:avLst/>
+            </a:prstGeom>
+          </p:spPr>
+        </p:pic>
+        <p:sp>
+          <p:nvSpPr>
+            <p:cNvPr id="4" name="Retângulo 3">
+              <a:extLst>
+                <a:ext uri="{FF2B5EF4-FFF2-40B4-BE49-F238E27FC236}">
+                  <a16:creationId xmlns:a16="http://schemas.microsoft.com/office/drawing/2014/main" id="{4A310ADA-F24F-4448-C028-CDC63D0692F7}"/>
+                </a:ext>
+              </a:extLst>
+            </p:cNvPr>
+            <p:cNvSpPr/>
+            <p:nvPr/>
+          </p:nvSpPr>
+          <p:spPr>
+            <a:xfrm>
+              <a:off x="0" y="0"/>
+              <a:ext cx="2663825" cy="3778965"/>
+            </a:xfrm>
+            <a:prstGeom prst="rect">
+              <a:avLst/>
+            </a:prstGeom>
+            <a:noFill/>
+            <a:ln w="6350">
+              <a:solidFill>
+                <a:schemeClr val="tx1"/>
+              </a:solidFill>
+            </a:ln>
+          </p:spPr>
+          <p:style>
+            <a:lnRef idx="2">
+              <a:schemeClr val="accent6"/>
+            </a:lnRef>
+            <a:fillRef idx="1">
+              <a:schemeClr val="lt1"/>
+            </a:fillRef>
+            <a:effectRef idx="0">
+              <a:schemeClr val="accent6"/>
+            </a:effectRef>
+            <a:fontRef idx="minor">
+              <a:schemeClr val="dk1"/>
+            </a:fontRef>
+          </p:style>
+          <p:txBody>
+            <a:bodyPr rtlCol="0" anchor="ctr"/>
+            <a:lstStyle/>
+            <a:p>
+              <a:pPr algn="ctr"/>
+              <a:endParaRPr lang="pt-PT"/>
+            </a:p>
+          </p:txBody>
+        </p:sp>
+      </p:grpSp>
     </p:spTree>
     <p:extLst>
       <p:ext uri="{BB962C8B-B14F-4D97-AF65-F5344CB8AC3E}">

</xml_diff>